<commit_message>
Version3.7; Added documentation for ESP8266 WiFi nodes
</commit_message>
<xml_diff>
--- a/DeveloperGuide/ArchitectureGuide/architecture.pptx
+++ b/DeveloperGuide/ArchitectureGuide/architecture.pptx
@@ -5,7 +5,7 @@
     <p:sldMasterId id="2147483648" r:id="rId1"/>
   </p:sldMasterIdLst>
   <p:notesMasterIdLst>
-    <p:notesMasterId r:id="rId8"/>
+    <p:notesMasterId r:id="rId9"/>
   </p:notesMasterIdLst>
   <p:sldIdLst>
     <p:sldId id="256" r:id="rId2"/>
@@ -14,6 +14,7 @@
     <p:sldId id="259" r:id="rId5"/>
     <p:sldId id="260" r:id="rId6"/>
     <p:sldId id="261" r:id="rId7"/>
+    <p:sldId id="262" r:id="rId8"/>
   </p:sldIdLst>
   <p:sldSz cx="9144000" cy="6858000" type="screen4x3"/>
   <p:notesSz cx="6858000" cy="9144000"/>
@@ -213,7 +214,7 @@
           <a:p>
             <a:fld id="{AF2A1E05-E974-4380-82C7-142D20023EC5}" type="datetimeFigureOut">
               <a:rPr lang="nl-NL" smtClean="0"/>
-              <a:t>1-12-2015</a:t>
+              <a:t>26-12-2015</a:t>
             </a:fld>
             <a:endParaRPr lang="nl-NL"/>
           </a:p>
@@ -1361,6 +1362,230 @@
 </p:notes>
 </file>
 
+<file path=ppt/notesSlides/notesSlide6.xml><?xml version="1.0" encoding="utf-8"?>
+<p:notes xmlns:a="http://schemas.openxmlformats.org/drawingml/2006/main" xmlns:r="http://schemas.openxmlformats.org/officeDocument/2006/relationships" xmlns:p="http://schemas.openxmlformats.org/presentationml/2006/main">
+  <p:cSld>
+    <p:spTree>
+      <p:nvGrpSpPr>
+        <p:cNvPr id="1" name=""/>
+        <p:cNvGrpSpPr/>
+        <p:nvPr/>
+      </p:nvGrpSpPr>
+      <p:grpSpPr>
+        <a:xfrm>
+          <a:off x="0" y="0"/>
+          <a:ext cx="0" cy="0"/>
+          <a:chOff x="0" y="0"/>
+          <a:chExt cx="0" cy="0"/>
+        </a:xfrm>
+      </p:grpSpPr>
+      <p:sp>
+        <p:nvSpPr>
+          <p:cNvPr id="2" name="Tijdelijke aanduiding voor dia-afbeelding 1"/>
+          <p:cNvSpPr>
+            <a:spLocks noGrp="1" noRot="1" noChangeAspect="1"/>
+          </p:cNvSpPr>
+          <p:nvPr>
+            <p:ph type="sldImg"/>
+          </p:nvPr>
+        </p:nvSpPr>
+        <p:spPr/>
+      </p:sp>
+      <p:sp>
+        <p:nvSpPr>
+          <p:cNvPr id="3" name="Tijdelijke aanduiding voor notities 2"/>
+          <p:cNvSpPr>
+            <a:spLocks noGrp="1"/>
+          </p:cNvSpPr>
+          <p:nvPr>
+            <p:ph type="body" idx="1"/>
+          </p:nvPr>
+        </p:nvSpPr>
+        <p:spPr/>
+        <p:txBody>
+          <a:bodyPr/>
+          <a:lstStyle/>
+          <a:p>
+            <a:r>
+              <a:rPr lang="nl-NL" dirty="0" smtClean="0"/>
+              <a:t>Version 3: </a:t>
+            </a:r>
+            <a:r>
+              <a:rPr lang="nl-NL" dirty="0" err="1" smtClean="0"/>
+              <a:t>Use</a:t>
+            </a:r>
+            <a:r>
+              <a:rPr lang="nl-NL" dirty="0" smtClean="0"/>
+              <a:t> </a:t>
+            </a:r>
+            <a:r>
+              <a:rPr lang="nl-NL" dirty="0" err="1" smtClean="0"/>
+              <a:t>an</a:t>
+            </a:r>
+            <a:r>
+              <a:rPr lang="nl-NL" baseline="0" dirty="0" smtClean="0"/>
+              <a:t> ESP8266 node </a:t>
+            </a:r>
+            <a:r>
+              <a:rPr lang="nl-NL" baseline="0" dirty="0" err="1" smtClean="0"/>
+              <a:t>instead</a:t>
+            </a:r>
+            <a:r>
+              <a:rPr lang="nl-NL" baseline="0" dirty="0" smtClean="0"/>
+              <a:t> of </a:t>
+            </a:r>
+            <a:r>
+              <a:rPr lang="nl-NL" baseline="0" dirty="0" err="1" smtClean="0"/>
+              <a:t>the</a:t>
+            </a:r>
+            <a:r>
+              <a:rPr lang="nl-NL" baseline="0" dirty="0" smtClean="0"/>
+              <a:t> </a:t>
+            </a:r>
+            <a:r>
+              <a:rPr lang="nl-NL" baseline="0" dirty="0" err="1" smtClean="0"/>
+              <a:t>Raspberry</a:t>
+            </a:r>
+            <a:r>
+              <a:rPr lang="nl-NL" baseline="0" dirty="0" smtClean="0"/>
+              <a:t> as a </a:t>
+            </a:r>
+            <a:r>
+              <a:rPr lang="nl-NL" baseline="0" dirty="0" err="1" smtClean="0"/>
+              <a:t>slave</a:t>
+            </a:r>
+            <a:r>
+              <a:rPr lang="nl-NL" baseline="0" dirty="0" smtClean="0"/>
+              <a:t> node. The ESP is </a:t>
+            </a:r>
+            <a:r>
+              <a:rPr lang="nl-NL" baseline="0" dirty="0" err="1" smtClean="0"/>
+              <a:t>much</a:t>
+            </a:r>
+            <a:r>
+              <a:rPr lang="nl-NL" baseline="0" dirty="0" smtClean="0"/>
+              <a:t> </a:t>
+            </a:r>
+            <a:r>
+              <a:rPr lang="nl-NL" baseline="0" dirty="0" err="1" smtClean="0"/>
+              <a:t>cheaper</a:t>
+            </a:r>
+            <a:r>
+              <a:rPr lang="nl-NL" baseline="0" dirty="0" smtClean="0"/>
+              <a:t> </a:t>
+            </a:r>
+            <a:r>
+              <a:rPr lang="nl-NL" baseline="0" dirty="0" err="1" smtClean="0"/>
+              <a:t>and</a:t>
+            </a:r>
+            <a:r>
+              <a:rPr lang="nl-NL" baseline="0" dirty="0" smtClean="0"/>
+              <a:t> as </a:t>
+            </a:r>
+            <a:r>
+              <a:rPr lang="nl-NL" baseline="0" dirty="0" err="1" smtClean="0"/>
+              <a:t>it</a:t>
+            </a:r>
+            <a:r>
+              <a:rPr lang="nl-NL" baseline="0" dirty="0" smtClean="0"/>
+              <a:t> does </a:t>
+            </a:r>
+            <a:r>
+              <a:rPr lang="nl-NL" baseline="0" dirty="0" err="1" smtClean="0"/>
+              <a:t>not</a:t>
+            </a:r>
+            <a:r>
+              <a:rPr lang="nl-NL" baseline="0" dirty="0" smtClean="0"/>
+              <a:t> run </a:t>
+            </a:r>
+            <a:r>
+              <a:rPr lang="nl-NL" baseline="0" dirty="0" err="1" smtClean="0"/>
+              <a:t>the</a:t>
+            </a:r>
+            <a:r>
+              <a:rPr lang="nl-NL" baseline="0" dirty="0" smtClean="0"/>
+              <a:t> Linux operating system </a:t>
+            </a:r>
+            <a:r>
+              <a:rPr lang="nl-NL" baseline="0" dirty="0" err="1" smtClean="0"/>
+              <a:t>its</a:t>
+            </a:r>
+            <a:r>
+              <a:rPr lang="nl-NL" baseline="0" dirty="0" smtClean="0"/>
+              <a:t> </a:t>
+            </a:r>
+            <a:r>
+              <a:rPr lang="nl-NL" baseline="0" dirty="0" err="1" smtClean="0"/>
+              <a:t>bahaviour</a:t>
+            </a:r>
+            <a:r>
+              <a:rPr lang="nl-NL" baseline="0" dirty="0" smtClean="0"/>
+              <a:t> in controlling GPIO </a:t>
+            </a:r>
+            <a:r>
+              <a:rPr lang="nl-NL" baseline="0" dirty="0" err="1" smtClean="0"/>
+              <a:t>interrupts</a:t>
+            </a:r>
+            <a:r>
+              <a:rPr lang="nl-NL" baseline="0" dirty="0" smtClean="0"/>
+              <a:t> is </a:t>
+            </a:r>
+            <a:r>
+              <a:rPr lang="nl-NL" baseline="0" dirty="0" err="1" smtClean="0"/>
+              <a:t>much</a:t>
+            </a:r>
+            <a:r>
+              <a:rPr lang="nl-NL" baseline="0" dirty="0" smtClean="0"/>
+              <a:t> </a:t>
+            </a:r>
+            <a:r>
+              <a:rPr lang="nl-NL" baseline="0" dirty="0" err="1" smtClean="0"/>
+              <a:t>better</a:t>
+            </a:r>
+            <a:r>
+              <a:rPr lang="nl-NL" baseline="0" dirty="0" smtClean="0"/>
+              <a:t>.</a:t>
+            </a:r>
+            <a:endParaRPr lang="nl-NL" dirty="0"/>
+          </a:p>
+        </p:txBody>
+      </p:sp>
+      <p:sp>
+        <p:nvSpPr>
+          <p:cNvPr id="4" name="Tijdelijke aanduiding voor dianummer 3"/>
+          <p:cNvSpPr>
+            <a:spLocks noGrp="1"/>
+          </p:cNvSpPr>
+          <p:nvPr>
+            <p:ph type="sldNum" sz="quarter" idx="10"/>
+          </p:nvPr>
+        </p:nvSpPr>
+        <p:spPr/>
+        <p:txBody>
+          <a:bodyPr/>
+          <a:lstStyle/>
+          <a:p>
+            <a:fld id="{158AD81D-3061-441A-B732-6B9A356D8602}" type="slidenum">
+              <a:rPr lang="nl-NL" smtClean="0"/>
+              <a:t>7</a:t>
+            </a:fld>
+            <a:endParaRPr lang="nl-NL"/>
+          </a:p>
+        </p:txBody>
+      </p:sp>
+    </p:spTree>
+    <p:extLst>
+      <p:ext uri="{BB962C8B-B14F-4D97-AF65-F5344CB8AC3E}">
+        <p14:creationId xmlns:p14="http://schemas.microsoft.com/office/powerpoint/2010/main" val="2275836142"/>
+      </p:ext>
+    </p:extLst>
+  </p:cSld>
+  <p:clrMapOvr>
+    <a:masterClrMapping/>
+  </p:clrMapOvr>
+</p:notes>
+</file>
+
 <file path=ppt/slideLayouts/slideLayout1.xml><?xml version="1.0" encoding="utf-8"?>
 <p:sldLayout xmlns:a="http://schemas.openxmlformats.org/drawingml/2006/main" xmlns:r="http://schemas.openxmlformats.org/officeDocument/2006/relationships" xmlns:p="http://schemas.openxmlformats.org/presentationml/2006/main" type="title" preserve="1">
   <p:cSld name="Titeldia">
@@ -1542,7 +1767,7 @@
           <a:p>
             <a:fld id="{2E5BAFD1-66B7-4D5A-B614-B7EE7B6EB2D0}" type="datetimeFigureOut">
               <a:rPr lang="en-US" smtClean="0"/>
-              <a:t>12/1/2015</a:t>
+              <a:t>12/26/2015</a:t>
             </a:fld>
             <a:endParaRPr lang="en-US"/>
           </a:p>
@@ -1712,7 +1937,7 @@
           <a:p>
             <a:fld id="{2E5BAFD1-66B7-4D5A-B614-B7EE7B6EB2D0}" type="datetimeFigureOut">
               <a:rPr lang="en-US" smtClean="0"/>
-              <a:t>12/1/2015</a:t>
+              <a:t>12/26/2015</a:t>
             </a:fld>
             <a:endParaRPr lang="en-US"/>
           </a:p>
@@ -1892,7 +2117,7 @@
           <a:p>
             <a:fld id="{2E5BAFD1-66B7-4D5A-B614-B7EE7B6EB2D0}" type="datetimeFigureOut">
               <a:rPr lang="en-US" smtClean="0"/>
-              <a:t>12/1/2015</a:t>
+              <a:t>12/26/2015</a:t>
             </a:fld>
             <a:endParaRPr lang="en-US"/>
           </a:p>
@@ -2062,7 +2287,7 @@
           <a:p>
             <a:fld id="{2E5BAFD1-66B7-4D5A-B614-B7EE7B6EB2D0}" type="datetimeFigureOut">
               <a:rPr lang="en-US" smtClean="0"/>
-              <a:t>12/1/2015</a:t>
+              <a:t>12/26/2015</a:t>
             </a:fld>
             <a:endParaRPr lang="en-US"/>
           </a:p>
@@ -2308,7 +2533,7 @@
           <a:p>
             <a:fld id="{2E5BAFD1-66B7-4D5A-B614-B7EE7B6EB2D0}" type="datetimeFigureOut">
               <a:rPr lang="en-US" smtClean="0"/>
-              <a:t>12/1/2015</a:t>
+              <a:t>12/26/2015</a:t>
             </a:fld>
             <a:endParaRPr lang="en-US"/>
           </a:p>
@@ -2596,7 +2821,7 @@
           <a:p>
             <a:fld id="{2E5BAFD1-66B7-4D5A-B614-B7EE7B6EB2D0}" type="datetimeFigureOut">
               <a:rPr lang="en-US" smtClean="0"/>
-              <a:t>12/1/2015</a:t>
+              <a:t>12/26/2015</a:t>
             </a:fld>
             <a:endParaRPr lang="en-US"/>
           </a:p>
@@ -3018,7 +3243,7 @@
           <a:p>
             <a:fld id="{2E5BAFD1-66B7-4D5A-B614-B7EE7B6EB2D0}" type="datetimeFigureOut">
               <a:rPr lang="en-US" smtClean="0"/>
-              <a:t>12/1/2015</a:t>
+              <a:t>12/26/2015</a:t>
             </a:fld>
             <a:endParaRPr lang="en-US"/>
           </a:p>
@@ -3136,7 +3361,7 @@
           <a:p>
             <a:fld id="{2E5BAFD1-66B7-4D5A-B614-B7EE7B6EB2D0}" type="datetimeFigureOut">
               <a:rPr lang="en-US" smtClean="0"/>
-              <a:t>12/1/2015</a:t>
+              <a:t>12/26/2015</a:t>
             </a:fld>
             <a:endParaRPr lang="en-US"/>
           </a:p>
@@ -3231,7 +3456,7 @@
           <a:p>
             <a:fld id="{2E5BAFD1-66B7-4D5A-B614-B7EE7B6EB2D0}" type="datetimeFigureOut">
               <a:rPr lang="en-US" smtClean="0"/>
-              <a:t>12/1/2015</a:t>
+              <a:t>12/26/2015</a:t>
             </a:fld>
             <a:endParaRPr lang="en-US"/>
           </a:p>
@@ -3508,7 +3733,7 @@
           <a:p>
             <a:fld id="{2E5BAFD1-66B7-4D5A-B614-B7EE7B6EB2D0}" type="datetimeFigureOut">
               <a:rPr lang="en-US" smtClean="0"/>
-              <a:t>12/1/2015</a:t>
+              <a:t>12/26/2015</a:t>
             </a:fld>
             <a:endParaRPr lang="en-US"/>
           </a:p>
@@ -3761,7 +3986,7 @@
           <a:p>
             <a:fld id="{2E5BAFD1-66B7-4D5A-B614-B7EE7B6EB2D0}" type="datetimeFigureOut">
               <a:rPr lang="en-US" smtClean="0"/>
-              <a:t>12/1/2015</a:t>
+              <a:t>12/26/2015</a:t>
             </a:fld>
             <a:endParaRPr lang="en-US"/>
           </a:p>
@@ -3974,7 +4199,7 @@
           <a:p>
             <a:fld id="{2E5BAFD1-66B7-4D5A-B614-B7EE7B6EB2D0}" type="datetimeFigureOut">
               <a:rPr lang="en-US" smtClean="0"/>
-              <a:t>12/1/2015</a:t>
+              <a:t>12/26/2015</a:t>
             </a:fld>
             <a:endParaRPr lang="en-US"/>
           </a:p>
@@ -4688,13 +4913,6 @@
   <p:clrMapOvr>
     <a:masterClrMapping/>
   </p:clrMapOvr>
-  <p:timing>
-    <p:tnLst>
-      <p:par>
-        <p:cTn id="1" dur="indefinite" restart="never" nodeType="tmRoot"/>
-      </p:par>
-    </p:tnLst>
-  </p:timing>
 </p:sld>
 </file>
 
@@ -6375,13 +6593,6 @@
   <p:clrMapOvr>
     <a:masterClrMapping/>
   </p:clrMapOvr>
-  <p:timing>
-    <p:tnLst>
-      <p:par>
-        <p:cTn id="1" dur="indefinite" restart="never" nodeType="tmRoot"/>
-      </p:par>
-    </p:tnLst>
-  </p:timing>
 </p:sld>
 </file>
 
@@ -7735,13 +7946,6 @@
   <p:clrMapOvr>
     <a:masterClrMapping/>
   </p:clrMapOvr>
-  <p:timing>
-    <p:tnLst>
-      <p:par>
-        <p:cTn id="1" dur="indefinite" restart="never" nodeType="tmRoot"/>
-      </p:par>
-    </p:tnLst>
-  </p:timing>
 </p:sld>
 </file>
 
@@ -9583,13 +9787,6 @@
   <p:clrMapOvr>
     <a:masterClrMapping/>
   </p:clrMapOvr>
-  <p:timing>
-    <p:tnLst>
-      <p:par>
-        <p:cTn id="1" dur="indefinite" restart="never" nodeType="tmRoot"/>
-      </p:par>
-    </p:tnLst>
-  </p:timing>
 </p:sld>
 </file>
 
@@ -11023,13 +11220,6 @@
   <p:clrMapOvr>
     <a:masterClrMapping/>
   </p:clrMapOvr>
-  <p:timing>
-    <p:tnLst>
-      <p:par>
-        <p:cTn id="1" dur="indefinite" restart="never" nodeType="tmRoot"/>
-      </p:par>
-    </p:tnLst>
-  </p:timing>
 </p:sld>
 </file>
 
@@ -11418,8 +11608,8 @@
         </p:nvCxnSpPr>
         <p:spPr>
           <a:xfrm>
-            <a:off x="3419872" y="1988840"/>
-            <a:ext cx="4248472" cy="0"/>
+            <a:off x="3635896" y="1988840"/>
+            <a:ext cx="4032448" cy="0"/>
           </a:xfrm>
           <a:prstGeom prst="line">
             <a:avLst/>
@@ -11576,7 +11766,7 @@
         </p:nvCxnSpPr>
         <p:spPr>
           <a:xfrm flipV="1">
-            <a:off x="3419872" y="1988840"/>
+            <a:off x="3635896" y="1988840"/>
             <a:ext cx="0" cy="576064"/>
           </a:xfrm>
           <a:prstGeom prst="line">
@@ -12088,13 +12278,1447 @@
   <p:clrMapOvr>
     <a:masterClrMapping/>
   </p:clrMapOvr>
-  <p:timing>
-    <p:tnLst>
-      <p:par>
-        <p:cTn id="1" dur="indefinite" restart="never" nodeType="tmRoot"/>
-      </p:par>
-    </p:tnLst>
-  </p:timing>
+</p:sld>
+</file>
+
+<file path=ppt/slides/slide7.xml><?xml version="1.0" encoding="utf-8"?>
+<p:sld xmlns:a="http://schemas.openxmlformats.org/drawingml/2006/main" xmlns:r="http://schemas.openxmlformats.org/officeDocument/2006/relationships" xmlns:p="http://schemas.openxmlformats.org/presentationml/2006/main">
+  <p:cSld>
+    <p:spTree>
+      <p:nvGrpSpPr>
+        <p:cNvPr id="1" name=""/>
+        <p:cNvGrpSpPr/>
+        <p:nvPr/>
+      </p:nvGrpSpPr>
+      <p:grpSpPr>
+        <a:xfrm>
+          <a:off x="0" y="0"/>
+          <a:ext cx="0" cy="0"/>
+          <a:chOff x="0" y="0"/>
+          <a:chExt cx="0" cy="0"/>
+        </a:xfrm>
+      </p:grpSpPr>
+      <p:sp>
+        <p:nvSpPr>
+          <p:cNvPr id="63" name="Stroomdiagram: Vooraf gedefinieerd proces 62"/>
+          <p:cNvSpPr/>
+          <p:nvPr/>
+        </p:nvSpPr>
+        <p:spPr>
+          <a:xfrm>
+            <a:off x="3203848" y="5589240"/>
+            <a:ext cx="1718838" cy="611855"/>
+          </a:xfrm>
+          <a:prstGeom prst="flowChartPredefinedProcess">
+            <a:avLst/>
+          </a:prstGeom>
+        </p:spPr>
+        <p:style>
+          <a:lnRef idx="2">
+            <a:schemeClr val="accent1">
+              <a:shade val="50000"/>
+            </a:schemeClr>
+          </a:lnRef>
+          <a:fillRef idx="1">
+            <a:schemeClr val="accent1"/>
+          </a:fillRef>
+          <a:effectRef idx="0">
+            <a:schemeClr val="accent1"/>
+          </a:effectRef>
+          <a:fontRef idx="minor">
+            <a:schemeClr val="lt1"/>
+          </a:fontRef>
+        </p:style>
+        <p:txBody>
+          <a:bodyPr rtlCol="0" anchor="ctr"/>
+          <a:lstStyle/>
+          <a:p>
+            <a:pPr algn="ctr"/>
+            <a:r>
+              <a:rPr lang="nl-NL" smtClean="0"/>
+              <a:t>868MHz </a:t>
+            </a:r>
+            <a:r>
+              <a:rPr lang="nl-NL" dirty="0" err="1" smtClean="0"/>
+              <a:t>transceiver</a:t>
+            </a:r>
+            <a:endParaRPr lang="en-US" dirty="0"/>
+          </a:p>
+        </p:txBody>
+      </p:sp>
+      <p:sp>
+        <p:nvSpPr>
+          <p:cNvPr id="62" name="Stroomdiagram: Vooraf gedefinieerd proces 61"/>
+          <p:cNvSpPr/>
+          <p:nvPr/>
+        </p:nvSpPr>
+        <p:spPr>
+          <a:xfrm>
+            <a:off x="3085156" y="3733068"/>
+            <a:ext cx="1420089" cy="683748"/>
+          </a:xfrm>
+          <a:prstGeom prst="flowChartPredefinedProcess">
+            <a:avLst/>
+          </a:prstGeom>
+        </p:spPr>
+        <p:style>
+          <a:lnRef idx="2">
+            <a:schemeClr val="accent1">
+              <a:shade val="50000"/>
+            </a:schemeClr>
+          </a:lnRef>
+          <a:fillRef idx="1">
+            <a:schemeClr val="accent1"/>
+          </a:fillRef>
+          <a:effectRef idx="0">
+            <a:schemeClr val="accent1"/>
+          </a:effectRef>
+          <a:fontRef idx="minor">
+            <a:schemeClr val="lt1"/>
+          </a:fontRef>
+        </p:style>
+        <p:txBody>
+          <a:bodyPr rtlCol="0" anchor="ctr"/>
+          <a:lstStyle/>
+          <a:p>
+            <a:pPr algn="ctr"/>
+            <a:r>
+              <a:rPr lang="nl-NL" dirty="0" err="1" smtClean="0"/>
+              <a:t>Wired</a:t>
+            </a:r>
+            <a:endParaRPr lang="nl-NL" dirty="0" smtClean="0"/>
+          </a:p>
+        </p:txBody>
+      </p:sp>
+      <p:sp>
+        <p:nvSpPr>
+          <p:cNvPr id="60" name="Stroomdiagram: Vooraf gedefinieerd proces 59"/>
+          <p:cNvSpPr/>
+          <p:nvPr/>
+        </p:nvSpPr>
+        <p:spPr>
+          <a:xfrm>
+            <a:off x="3258837" y="3919835"/>
+            <a:ext cx="1541796" cy="738348"/>
+          </a:xfrm>
+          <a:prstGeom prst="flowChartPredefinedProcess">
+            <a:avLst/>
+          </a:prstGeom>
+        </p:spPr>
+        <p:style>
+          <a:lnRef idx="2">
+            <a:schemeClr val="accent1">
+              <a:shade val="50000"/>
+            </a:schemeClr>
+          </a:lnRef>
+          <a:fillRef idx="1">
+            <a:schemeClr val="accent1"/>
+          </a:fillRef>
+          <a:effectRef idx="0">
+            <a:schemeClr val="accent1"/>
+          </a:effectRef>
+          <a:fontRef idx="minor">
+            <a:schemeClr val="lt1"/>
+          </a:fontRef>
+        </p:style>
+        <p:txBody>
+          <a:bodyPr rtlCol="0" anchor="ctr"/>
+          <a:lstStyle/>
+          <a:p>
+            <a:pPr algn="ctr"/>
+            <a:r>
+              <a:rPr lang="nl-NL" dirty="0" err="1" smtClean="0"/>
+              <a:t>Wired</a:t>
+            </a:r>
+            <a:endParaRPr lang="nl-NL" dirty="0" smtClean="0"/>
+          </a:p>
+          <a:p>
+            <a:pPr algn="ctr"/>
+            <a:r>
+              <a:rPr lang="nl-NL" dirty="0" smtClean="0"/>
+              <a:t>Sensors</a:t>
+            </a:r>
+            <a:endParaRPr lang="en-US" dirty="0"/>
+          </a:p>
+        </p:txBody>
+      </p:sp>
+      <p:sp>
+        <p:nvSpPr>
+          <p:cNvPr id="111" name="Afgeronde rechthoek 110"/>
+          <p:cNvSpPr/>
+          <p:nvPr/>
+        </p:nvSpPr>
+        <p:spPr>
+          <a:xfrm>
+            <a:off x="179661" y="2998156"/>
+            <a:ext cx="4685625" cy="592250"/>
+          </a:xfrm>
+          <a:prstGeom prst="roundRect">
+            <a:avLst/>
+          </a:prstGeom>
+          <a:solidFill>
+            <a:schemeClr val="accent5">
+              <a:lumMod val="20000"/>
+              <a:lumOff val="80000"/>
+            </a:schemeClr>
+          </a:solidFill>
+          <a:ln>
+            <a:noFill/>
+          </a:ln>
+        </p:spPr>
+        <p:style>
+          <a:lnRef idx="2">
+            <a:schemeClr val="accent1">
+              <a:shade val="50000"/>
+            </a:schemeClr>
+          </a:lnRef>
+          <a:fillRef idx="1">
+            <a:schemeClr val="accent1"/>
+          </a:fillRef>
+          <a:effectRef idx="0">
+            <a:schemeClr val="accent1"/>
+          </a:effectRef>
+          <a:fontRef idx="minor">
+            <a:schemeClr val="lt1"/>
+          </a:fontRef>
+        </p:style>
+        <p:txBody>
+          <a:bodyPr rtlCol="0" anchor="ctr"/>
+          <a:lstStyle/>
+          <a:p>
+            <a:pPr algn="ctr"/>
+            <a:endParaRPr lang="en-US"/>
+          </a:p>
+        </p:txBody>
+      </p:sp>
+      <p:grpSp>
+        <p:nvGrpSpPr>
+          <p:cNvPr id="6" name="Groep 5"/>
+          <p:cNvGrpSpPr/>
+          <p:nvPr/>
+        </p:nvGrpSpPr>
+        <p:grpSpPr>
+          <a:xfrm>
+            <a:off x="3185921" y="1960154"/>
+            <a:ext cx="803976" cy="908859"/>
+            <a:chOff x="5865390" y="5737239"/>
+            <a:chExt cx="845103" cy="1005166"/>
+          </a:xfrm>
+        </p:grpSpPr>
+        <p:sp>
+          <p:nvSpPr>
+            <p:cNvPr id="42" name="Stroomdiagram: Magnetische schijf 41"/>
+            <p:cNvSpPr/>
+            <p:nvPr/>
+          </p:nvSpPr>
+          <p:spPr>
+            <a:xfrm>
+              <a:off x="5885441" y="5737239"/>
+              <a:ext cx="825052" cy="1005166"/>
+            </a:xfrm>
+            <a:prstGeom prst="flowChartMagneticDisk">
+              <a:avLst/>
+            </a:prstGeom>
+          </p:spPr>
+          <p:style>
+            <a:lnRef idx="2">
+              <a:schemeClr val="accent1">
+                <a:shade val="50000"/>
+              </a:schemeClr>
+            </a:lnRef>
+            <a:fillRef idx="1">
+              <a:schemeClr val="accent1"/>
+            </a:fillRef>
+            <a:effectRef idx="0">
+              <a:schemeClr val="accent1"/>
+            </a:effectRef>
+            <a:fontRef idx="minor">
+              <a:schemeClr val="lt1"/>
+            </a:fontRef>
+          </p:style>
+          <p:txBody>
+            <a:bodyPr rtlCol="0" anchor="ctr"/>
+            <a:lstStyle/>
+            <a:p>
+              <a:pPr algn="ctr"/>
+              <a:endParaRPr lang="en-US"/>
+            </a:p>
+          </p:txBody>
+        </p:sp>
+        <p:sp>
+          <p:nvSpPr>
+            <p:cNvPr id="10" name="Tekstvak 9"/>
+            <p:cNvSpPr txBox="1"/>
+            <p:nvPr/>
+          </p:nvSpPr>
+          <p:spPr>
+            <a:xfrm>
+              <a:off x="5865390" y="6028571"/>
+              <a:ext cx="845103" cy="369332"/>
+            </a:xfrm>
+            <a:prstGeom prst="rect">
+              <a:avLst/>
+            </a:prstGeom>
+            <a:noFill/>
+          </p:spPr>
+          <p:txBody>
+            <a:bodyPr wrap="none" rtlCol="0">
+              <a:spAutoFit/>
+            </a:bodyPr>
+            <a:lstStyle/>
+            <a:p>
+              <a:r>
+                <a:rPr lang="nl-NL" dirty="0" err="1" smtClean="0">
+                  <a:solidFill>
+                    <a:schemeClr val="bg1"/>
+                  </a:solidFill>
+                </a:rPr>
+                <a:t>MySQL</a:t>
+              </a:r>
+              <a:endParaRPr lang="en-US" dirty="0">
+                <a:solidFill>
+                  <a:schemeClr val="bg1"/>
+                </a:solidFill>
+              </a:endParaRPr>
+            </a:p>
+          </p:txBody>
+        </p:sp>
+      </p:grpSp>
+      <p:sp>
+        <p:nvSpPr>
+          <p:cNvPr id="20" name="Rechthoek 19"/>
+          <p:cNvSpPr/>
+          <p:nvPr/>
+        </p:nvSpPr>
+        <p:spPr>
+          <a:xfrm>
+            <a:off x="112757" y="13672"/>
+            <a:ext cx="1364468" cy="622920"/>
+          </a:xfrm>
+          <a:prstGeom prst="rect">
+            <a:avLst/>
+          </a:prstGeom>
+          <a:solidFill>
+            <a:schemeClr val="bg2">
+              <a:lumMod val="90000"/>
+            </a:schemeClr>
+          </a:solidFill>
+        </p:spPr>
+        <p:style>
+          <a:lnRef idx="2">
+            <a:schemeClr val="accent1">
+              <a:shade val="50000"/>
+            </a:schemeClr>
+          </a:lnRef>
+          <a:fillRef idx="1">
+            <a:schemeClr val="accent1"/>
+          </a:fillRef>
+          <a:effectRef idx="0">
+            <a:schemeClr val="accent1"/>
+          </a:effectRef>
+          <a:fontRef idx="minor">
+            <a:schemeClr val="lt1"/>
+          </a:fontRef>
+        </p:style>
+        <p:txBody>
+          <a:bodyPr rtlCol="0" anchor="ctr"/>
+          <a:lstStyle/>
+          <a:p>
+            <a:pPr algn="ctr"/>
+            <a:r>
+              <a:rPr lang="nl-NL" dirty="0" smtClean="0"/>
+              <a:t>GUI </a:t>
+            </a:r>
+            <a:r>
+              <a:rPr lang="nl-NL" dirty="0" err="1" smtClean="0"/>
+              <a:t>Clients</a:t>
+            </a:r>
+            <a:endParaRPr lang="en-US" dirty="0"/>
+          </a:p>
+        </p:txBody>
+      </p:sp>
+      <p:sp>
+        <p:nvSpPr>
+          <p:cNvPr id="21" name="Rechthoek 20"/>
+          <p:cNvSpPr/>
+          <p:nvPr/>
+        </p:nvSpPr>
+        <p:spPr>
+          <a:xfrm>
+            <a:off x="265157" y="166072"/>
+            <a:ext cx="1364468" cy="622920"/>
+          </a:xfrm>
+          <a:prstGeom prst="rect">
+            <a:avLst/>
+          </a:prstGeom>
+          <a:solidFill>
+            <a:schemeClr val="bg2">
+              <a:lumMod val="90000"/>
+            </a:schemeClr>
+          </a:solidFill>
+        </p:spPr>
+        <p:style>
+          <a:lnRef idx="2">
+            <a:schemeClr val="accent1">
+              <a:shade val="50000"/>
+            </a:schemeClr>
+          </a:lnRef>
+          <a:fillRef idx="1">
+            <a:schemeClr val="accent1"/>
+          </a:fillRef>
+          <a:effectRef idx="0">
+            <a:schemeClr val="accent1"/>
+          </a:effectRef>
+          <a:fontRef idx="minor">
+            <a:schemeClr val="lt1"/>
+          </a:fontRef>
+        </p:style>
+        <p:txBody>
+          <a:bodyPr rtlCol="0" anchor="ctr"/>
+          <a:lstStyle/>
+          <a:p>
+            <a:pPr algn="ctr"/>
+            <a:r>
+              <a:rPr lang="nl-NL" dirty="0" smtClean="0"/>
+              <a:t>GUI </a:t>
+            </a:r>
+            <a:r>
+              <a:rPr lang="nl-NL" dirty="0" err="1" smtClean="0"/>
+              <a:t>Clients</a:t>
+            </a:r>
+            <a:endParaRPr lang="en-US" dirty="0"/>
+          </a:p>
+        </p:txBody>
+      </p:sp>
+      <p:sp>
+        <p:nvSpPr>
+          <p:cNvPr id="22" name="Rechthoek 21"/>
+          <p:cNvSpPr/>
+          <p:nvPr/>
+        </p:nvSpPr>
+        <p:spPr>
+          <a:xfrm>
+            <a:off x="417557" y="318472"/>
+            <a:ext cx="1364468" cy="622920"/>
+          </a:xfrm>
+          <a:prstGeom prst="rect">
+            <a:avLst/>
+          </a:prstGeom>
+          <a:solidFill>
+            <a:schemeClr val="bg2">
+              <a:lumMod val="90000"/>
+            </a:schemeClr>
+          </a:solidFill>
+        </p:spPr>
+        <p:style>
+          <a:lnRef idx="2">
+            <a:schemeClr val="accent1">
+              <a:shade val="50000"/>
+            </a:schemeClr>
+          </a:lnRef>
+          <a:fillRef idx="1">
+            <a:schemeClr val="accent1"/>
+          </a:fillRef>
+          <a:effectRef idx="0">
+            <a:schemeClr val="accent1"/>
+          </a:effectRef>
+          <a:fontRef idx="minor">
+            <a:schemeClr val="lt1"/>
+          </a:fontRef>
+        </p:style>
+        <p:txBody>
+          <a:bodyPr rtlCol="0" anchor="ctr"/>
+          <a:lstStyle/>
+          <a:p>
+            <a:pPr algn="ctr"/>
+            <a:r>
+              <a:rPr lang="nl-NL" dirty="0" smtClean="0"/>
+              <a:t>GUI </a:t>
+            </a:r>
+            <a:r>
+              <a:rPr lang="nl-NL" dirty="0" err="1" smtClean="0"/>
+              <a:t>Clients</a:t>
+            </a:r>
+            <a:endParaRPr lang="en-US" dirty="0"/>
+          </a:p>
+        </p:txBody>
+      </p:sp>
+      <p:sp>
+        <p:nvSpPr>
+          <p:cNvPr id="23" name="Rechthoek 22"/>
+          <p:cNvSpPr/>
+          <p:nvPr/>
+        </p:nvSpPr>
+        <p:spPr>
+          <a:xfrm>
+            <a:off x="569957" y="470872"/>
+            <a:ext cx="1364468" cy="622920"/>
+          </a:xfrm>
+          <a:prstGeom prst="rect">
+            <a:avLst/>
+          </a:prstGeom>
+          <a:solidFill>
+            <a:schemeClr val="bg1">
+              <a:lumMod val="95000"/>
+            </a:schemeClr>
+          </a:solidFill>
+          <a:ln>
+            <a:solidFill>
+              <a:schemeClr val="tx2">
+                <a:lumMod val="75000"/>
+              </a:schemeClr>
+            </a:solidFill>
+          </a:ln>
+        </p:spPr>
+        <p:style>
+          <a:lnRef idx="2">
+            <a:schemeClr val="accent1">
+              <a:shade val="50000"/>
+            </a:schemeClr>
+          </a:lnRef>
+          <a:fillRef idx="1">
+            <a:schemeClr val="accent1"/>
+          </a:fillRef>
+          <a:effectRef idx="0">
+            <a:schemeClr val="accent1"/>
+          </a:effectRef>
+          <a:fontRef idx="minor">
+            <a:schemeClr val="lt1"/>
+          </a:fontRef>
+        </p:style>
+        <p:txBody>
+          <a:bodyPr rtlCol="0" anchor="ctr"/>
+          <a:lstStyle/>
+          <a:p>
+            <a:pPr algn="ctr"/>
+            <a:r>
+              <a:rPr lang="nl-NL" dirty="0" smtClean="0">
+                <a:solidFill>
+                  <a:schemeClr val="tx2">
+                    <a:lumMod val="75000"/>
+                  </a:schemeClr>
+                </a:solidFill>
+              </a:rPr>
+              <a:t>GUI </a:t>
+            </a:r>
+            <a:r>
+              <a:rPr lang="nl-NL" dirty="0" err="1" smtClean="0">
+                <a:solidFill>
+                  <a:schemeClr val="tx2">
+                    <a:lumMod val="75000"/>
+                  </a:schemeClr>
+                </a:solidFill>
+              </a:rPr>
+              <a:t>Clients</a:t>
+            </a:r>
+            <a:endParaRPr lang="en-US" dirty="0">
+              <a:solidFill>
+                <a:schemeClr val="tx2">
+                  <a:lumMod val="75000"/>
+                </a:schemeClr>
+              </a:solidFill>
+            </a:endParaRPr>
+          </a:p>
+        </p:txBody>
+      </p:sp>
+      <p:grpSp>
+        <p:nvGrpSpPr>
+          <p:cNvPr id="2" name="Groep 1"/>
+          <p:cNvGrpSpPr/>
+          <p:nvPr/>
+        </p:nvGrpSpPr>
+        <p:grpSpPr>
+          <a:xfrm>
+            <a:off x="4082598" y="1635667"/>
+            <a:ext cx="800826" cy="980061"/>
+            <a:chOff x="6726468" y="2592955"/>
+            <a:chExt cx="919336" cy="1236111"/>
+          </a:xfrm>
+        </p:grpSpPr>
+        <p:sp>
+          <p:nvSpPr>
+            <p:cNvPr id="43" name="Stroomdiagram: Magnetische schijf 42"/>
+            <p:cNvSpPr/>
+            <p:nvPr/>
+          </p:nvSpPr>
+          <p:spPr>
+            <a:xfrm>
+              <a:off x="6726468" y="2592955"/>
+              <a:ext cx="919336" cy="1236111"/>
+            </a:xfrm>
+            <a:prstGeom prst="flowChartMagneticDisk">
+              <a:avLst/>
+            </a:prstGeom>
+          </p:spPr>
+          <p:style>
+            <a:lnRef idx="2">
+              <a:schemeClr val="accent1">
+                <a:shade val="50000"/>
+              </a:schemeClr>
+            </a:lnRef>
+            <a:fillRef idx="1">
+              <a:schemeClr val="accent1"/>
+            </a:fillRef>
+            <a:effectRef idx="0">
+              <a:schemeClr val="accent1"/>
+            </a:effectRef>
+            <a:fontRef idx="minor">
+              <a:schemeClr val="lt1"/>
+            </a:fontRef>
+          </p:style>
+          <p:txBody>
+            <a:bodyPr rtlCol="0" anchor="ctr"/>
+            <a:lstStyle/>
+            <a:p>
+              <a:pPr algn="ctr"/>
+              <a:endParaRPr lang="en-US"/>
+            </a:p>
+          </p:txBody>
+        </p:sp>
+        <p:sp>
+          <p:nvSpPr>
+            <p:cNvPr id="45" name="Tekstvak 44"/>
+            <p:cNvSpPr txBox="1"/>
+            <p:nvPr/>
+          </p:nvSpPr>
+          <p:spPr>
+            <a:xfrm>
+              <a:off x="6806056" y="3031404"/>
+              <a:ext cx="835742" cy="646331"/>
+            </a:xfrm>
+            <a:prstGeom prst="rect">
+              <a:avLst/>
+            </a:prstGeom>
+            <a:noFill/>
+          </p:spPr>
+          <p:txBody>
+            <a:bodyPr wrap="none" rtlCol="0">
+              <a:spAutoFit/>
+            </a:bodyPr>
+            <a:lstStyle/>
+            <a:p>
+              <a:r>
+                <a:rPr lang="nl-NL" dirty="0" err="1" smtClean="0">
+                  <a:solidFill>
+                    <a:schemeClr val="bg1"/>
+                  </a:solidFill>
+                </a:rPr>
+                <a:t>Config</a:t>
+              </a:r>
+              <a:r>
+                <a:rPr lang="nl-NL" dirty="0" smtClean="0">
+                  <a:solidFill>
+                    <a:schemeClr val="bg1"/>
+                  </a:solidFill>
+                </a:rPr>
+                <a:t> </a:t>
+              </a:r>
+            </a:p>
+            <a:p>
+              <a:r>
+                <a:rPr lang="nl-NL" dirty="0" smtClean="0">
+                  <a:solidFill>
+                    <a:schemeClr val="bg1"/>
+                  </a:solidFill>
+                </a:rPr>
+                <a:t>file</a:t>
+              </a:r>
+              <a:endParaRPr lang="en-US" dirty="0">
+                <a:solidFill>
+                  <a:schemeClr val="bg1"/>
+                </a:solidFill>
+              </a:endParaRPr>
+            </a:p>
+          </p:txBody>
+        </p:sp>
+      </p:grpSp>
+      <p:sp>
+        <p:nvSpPr>
+          <p:cNvPr id="51" name="Stroomdiagram: Alternatief proces 50"/>
+          <p:cNvSpPr/>
+          <p:nvPr/>
+        </p:nvSpPr>
+        <p:spPr>
+          <a:xfrm>
+            <a:off x="306191" y="1974149"/>
+            <a:ext cx="1694419" cy="731117"/>
+          </a:xfrm>
+          <a:prstGeom prst="flowChartAlternateProcess">
+            <a:avLst/>
+          </a:prstGeom>
+          <a:solidFill>
+            <a:schemeClr val="accent6">
+              <a:lumMod val="60000"/>
+              <a:lumOff val="40000"/>
+            </a:schemeClr>
+          </a:solidFill>
+        </p:spPr>
+        <p:style>
+          <a:lnRef idx="2">
+            <a:schemeClr val="accent1">
+              <a:shade val="50000"/>
+            </a:schemeClr>
+          </a:lnRef>
+          <a:fillRef idx="1">
+            <a:schemeClr val="accent1"/>
+          </a:fillRef>
+          <a:effectRef idx="0">
+            <a:schemeClr val="accent1"/>
+          </a:effectRef>
+          <a:fontRef idx="minor">
+            <a:schemeClr val="lt1"/>
+          </a:fontRef>
+        </p:style>
+        <p:txBody>
+          <a:bodyPr rtlCol="0" anchor="ctr"/>
+          <a:lstStyle/>
+          <a:p>
+            <a:pPr algn="ctr"/>
+            <a:r>
+              <a:rPr lang="nl-NL" dirty="0" smtClean="0"/>
+              <a:t>LamPI-node.js</a:t>
+            </a:r>
+          </a:p>
+          <a:p>
+            <a:pPr algn="ctr"/>
+            <a:r>
+              <a:rPr lang="nl-NL" dirty="0" smtClean="0"/>
+              <a:t>(master)</a:t>
+            </a:r>
+            <a:endParaRPr lang="en-US" dirty="0"/>
+          </a:p>
+        </p:txBody>
+      </p:sp>
+      <p:cxnSp>
+        <p:nvCxnSpPr>
+          <p:cNvPr id="74" name="Rechte verbindingslijn met pijl 73"/>
+          <p:cNvCxnSpPr/>
+          <p:nvPr/>
+        </p:nvCxnSpPr>
+        <p:spPr>
+          <a:xfrm flipH="1">
+            <a:off x="156672" y="1531355"/>
+            <a:ext cx="2846304" cy="18634"/>
+          </a:xfrm>
+          <a:prstGeom prst="straightConnector1">
+            <a:avLst/>
+          </a:prstGeom>
+          <a:ln w="57150">
+            <a:headEnd type="triangle"/>
+            <a:tailEnd type="triangle"/>
+          </a:ln>
+        </p:spPr>
+        <p:style>
+          <a:lnRef idx="1">
+            <a:schemeClr val="accent1"/>
+          </a:lnRef>
+          <a:fillRef idx="0">
+            <a:schemeClr val="accent1"/>
+          </a:fillRef>
+          <a:effectRef idx="0">
+            <a:schemeClr val="accent1"/>
+          </a:effectRef>
+          <a:fontRef idx="minor">
+            <a:schemeClr val="tx1"/>
+          </a:fontRef>
+        </p:style>
+      </p:cxnSp>
+      <p:sp>
+        <p:nvSpPr>
+          <p:cNvPr id="107" name="Tekstvak 106"/>
+          <p:cNvSpPr txBox="1"/>
+          <p:nvPr/>
+        </p:nvSpPr>
+        <p:spPr>
+          <a:xfrm>
+            <a:off x="1008667" y="2928958"/>
+            <a:ext cx="1874680" cy="369332"/>
+          </a:xfrm>
+          <a:prstGeom prst="rect">
+            <a:avLst/>
+          </a:prstGeom>
+          <a:noFill/>
+        </p:spPr>
+        <p:txBody>
+          <a:bodyPr wrap="none" rtlCol="0">
+            <a:spAutoFit/>
+          </a:bodyPr>
+          <a:lstStyle/>
+          <a:p>
+            <a:r>
+              <a:rPr lang="nl-NL" dirty="0" smtClean="0"/>
+              <a:t>IP </a:t>
+            </a:r>
+            <a:r>
+              <a:rPr lang="nl-NL" dirty="0" err="1" smtClean="0"/>
+              <a:t>communication</a:t>
+            </a:r>
+            <a:endParaRPr lang="en-US" dirty="0"/>
+          </a:p>
+        </p:txBody>
+      </p:sp>
+      <p:sp>
+        <p:nvSpPr>
+          <p:cNvPr id="117" name="Tekstvak 116"/>
+          <p:cNvSpPr txBox="1"/>
+          <p:nvPr/>
+        </p:nvSpPr>
+        <p:spPr>
+          <a:xfrm>
+            <a:off x="1242050" y="1095122"/>
+            <a:ext cx="1270861" cy="369332"/>
+          </a:xfrm>
+          <a:prstGeom prst="rect">
+            <a:avLst/>
+          </a:prstGeom>
+          <a:noFill/>
+        </p:spPr>
+        <p:txBody>
+          <a:bodyPr wrap="none" rtlCol="0">
+            <a:spAutoFit/>
+          </a:bodyPr>
+          <a:lstStyle/>
+          <a:p>
+            <a:r>
+              <a:rPr lang="nl-NL" dirty="0" err="1" smtClean="0"/>
+              <a:t>websockets</a:t>
+            </a:r>
+            <a:endParaRPr lang="en-US" dirty="0"/>
+          </a:p>
+        </p:txBody>
+      </p:sp>
+      <p:cxnSp>
+        <p:nvCxnSpPr>
+          <p:cNvPr id="64" name="Rechte verbindingslijn met pijl 63"/>
+          <p:cNvCxnSpPr>
+            <a:endCxn id="111" idx="1"/>
+          </p:cNvCxnSpPr>
+          <p:nvPr/>
+        </p:nvCxnSpPr>
+        <p:spPr>
+          <a:xfrm flipH="1" flipV="1">
+            <a:off x="179661" y="3294281"/>
+            <a:ext cx="4613616" cy="10070"/>
+          </a:xfrm>
+          <a:prstGeom prst="straightConnector1">
+            <a:avLst/>
+          </a:prstGeom>
+          <a:ln w="57150">
+            <a:headEnd type="triangle"/>
+            <a:tailEnd type="triangle"/>
+          </a:ln>
+        </p:spPr>
+        <p:style>
+          <a:lnRef idx="1">
+            <a:schemeClr val="accent1"/>
+          </a:lnRef>
+          <a:fillRef idx="0">
+            <a:schemeClr val="accent1"/>
+          </a:fillRef>
+          <a:effectRef idx="0">
+            <a:schemeClr val="accent1"/>
+          </a:effectRef>
+          <a:fontRef idx="minor">
+            <a:schemeClr val="tx1"/>
+          </a:fontRef>
+        </p:style>
+      </p:cxnSp>
+      <p:cxnSp>
+        <p:nvCxnSpPr>
+          <p:cNvPr id="68" name="Rechte verbindingslijn met pijl 67"/>
+          <p:cNvCxnSpPr/>
+          <p:nvPr/>
+        </p:nvCxnSpPr>
+        <p:spPr>
+          <a:xfrm flipV="1">
+            <a:off x="683568" y="3341682"/>
+            <a:ext cx="5253" cy="1599486"/>
+          </a:xfrm>
+          <a:prstGeom prst="straightConnector1">
+            <a:avLst/>
+          </a:prstGeom>
+          <a:ln w="15875">
+            <a:headEnd type="triangle"/>
+            <a:tailEnd type="triangle"/>
+          </a:ln>
+        </p:spPr>
+        <p:style>
+          <a:lnRef idx="1">
+            <a:schemeClr val="accent1"/>
+          </a:lnRef>
+          <a:fillRef idx="0">
+            <a:schemeClr val="accent1"/>
+          </a:fillRef>
+          <a:effectRef idx="0">
+            <a:schemeClr val="accent1"/>
+          </a:effectRef>
+          <a:fontRef idx="minor">
+            <a:schemeClr val="tx1"/>
+          </a:fontRef>
+        </p:style>
+      </p:cxnSp>
+      <p:sp>
+        <p:nvSpPr>
+          <p:cNvPr id="36" name="Stroomdiagram: Alternatief proces 35"/>
+          <p:cNvSpPr/>
+          <p:nvPr/>
+        </p:nvSpPr>
+        <p:spPr>
+          <a:xfrm>
+            <a:off x="323528" y="4941168"/>
+            <a:ext cx="1694419" cy="659832"/>
+          </a:xfrm>
+          <a:prstGeom prst="flowChartAlternateProcess">
+            <a:avLst/>
+          </a:prstGeom>
+          <a:solidFill>
+            <a:schemeClr val="accent6">
+              <a:lumMod val="60000"/>
+              <a:lumOff val="40000"/>
+            </a:schemeClr>
+          </a:solidFill>
+        </p:spPr>
+        <p:style>
+          <a:lnRef idx="2">
+            <a:schemeClr val="accent1">
+              <a:shade val="50000"/>
+            </a:schemeClr>
+          </a:lnRef>
+          <a:fillRef idx="1">
+            <a:schemeClr val="accent1"/>
+          </a:fillRef>
+          <a:effectRef idx="0">
+            <a:schemeClr val="accent1"/>
+          </a:effectRef>
+          <a:fontRef idx="minor">
+            <a:schemeClr val="lt1"/>
+          </a:fontRef>
+        </p:style>
+        <p:txBody>
+          <a:bodyPr rtlCol="0" anchor="ctr"/>
+          <a:lstStyle/>
+          <a:p>
+            <a:pPr algn="ctr"/>
+            <a:r>
+              <a:rPr lang="nl-NL" dirty="0" smtClean="0"/>
+              <a:t>ESP Gateway</a:t>
+            </a:r>
+            <a:endParaRPr lang="en-US" dirty="0"/>
+          </a:p>
+        </p:txBody>
+      </p:sp>
+      <p:cxnSp>
+        <p:nvCxnSpPr>
+          <p:cNvPr id="49" name="Rechte verbindingslijn met pijl 48"/>
+          <p:cNvCxnSpPr/>
+          <p:nvPr/>
+        </p:nvCxnSpPr>
+        <p:spPr>
+          <a:xfrm flipV="1">
+            <a:off x="2339752" y="4393596"/>
+            <a:ext cx="605057" cy="691588"/>
+          </a:xfrm>
+          <a:prstGeom prst="straightConnector1">
+            <a:avLst/>
+          </a:prstGeom>
+          <a:ln>
+            <a:tailEnd type="triangle"/>
+          </a:ln>
+        </p:spPr>
+        <p:style>
+          <a:lnRef idx="3">
+            <a:schemeClr val="accent1"/>
+          </a:lnRef>
+          <a:fillRef idx="0">
+            <a:schemeClr val="accent1"/>
+          </a:fillRef>
+          <a:effectRef idx="2">
+            <a:schemeClr val="accent1"/>
+          </a:effectRef>
+          <a:fontRef idx="minor">
+            <a:schemeClr val="tx1"/>
+          </a:fontRef>
+        </p:style>
+      </p:cxnSp>
+      <p:cxnSp>
+        <p:nvCxnSpPr>
+          <p:cNvPr id="50" name="Rechte verbindingslijn met pijl 49"/>
+          <p:cNvCxnSpPr/>
+          <p:nvPr/>
+        </p:nvCxnSpPr>
+        <p:spPr>
+          <a:xfrm>
+            <a:off x="2339752" y="5373216"/>
+            <a:ext cx="810034" cy="618256"/>
+          </a:xfrm>
+          <a:prstGeom prst="straightConnector1">
+            <a:avLst/>
+          </a:prstGeom>
+          <a:ln>
+            <a:tailEnd type="triangle"/>
+          </a:ln>
+        </p:spPr>
+        <p:style>
+          <a:lnRef idx="3">
+            <a:schemeClr val="accent1"/>
+          </a:lnRef>
+          <a:fillRef idx="0">
+            <a:schemeClr val="accent1"/>
+          </a:fillRef>
+          <a:effectRef idx="2">
+            <a:schemeClr val="accent1"/>
+          </a:effectRef>
+          <a:fontRef idx="minor">
+            <a:schemeClr val="tx1"/>
+          </a:fontRef>
+        </p:style>
+      </p:cxnSp>
+      <p:cxnSp>
+        <p:nvCxnSpPr>
+          <p:cNvPr id="53" name="Rechte verbindingslijn met pijl 52"/>
+          <p:cNvCxnSpPr/>
+          <p:nvPr/>
+        </p:nvCxnSpPr>
+        <p:spPr>
+          <a:xfrm flipV="1">
+            <a:off x="1008667" y="2764754"/>
+            <a:ext cx="0" cy="541481"/>
+          </a:xfrm>
+          <a:prstGeom prst="straightConnector1">
+            <a:avLst/>
+          </a:prstGeom>
+          <a:ln w="15875">
+            <a:headEnd type="triangle"/>
+            <a:tailEnd type="triangle"/>
+          </a:ln>
+        </p:spPr>
+        <p:style>
+          <a:lnRef idx="1">
+            <a:schemeClr val="accent1"/>
+          </a:lnRef>
+          <a:fillRef idx="0">
+            <a:schemeClr val="accent1"/>
+          </a:fillRef>
+          <a:effectRef idx="0">
+            <a:schemeClr val="accent1"/>
+          </a:effectRef>
+          <a:fontRef idx="minor">
+            <a:schemeClr val="tx1"/>
+          </a:fontRef>
+        </p:style>
+      </p:cxnSp>
+      <p:cxnSp>
+        <p:nvCxnSpPr>
+          <p:cNvPr id="61" name="Rechte verbindingslijn met pijl 60"/>
+          <p:cNvCxnSpPr/>
+          <p:nvPr/>
+        </p:nvCxnSpPr>
+        <p:spPr>
+          <a:xfrm flipV="1">
+            <a:off x="1008667" y="1072124"/>
+            <a:ext cx="0" cy="477865"/>
+          </a:xfrm>
+          <a:prstGeom prst="straightConnector1">
+            <a:avLst/>
+          </a:prstGeom>
+          <a:ln w="15875">
+            <a:headEnd type="triangle"/>
+            <a:tailEnd type="triangle"/>
+          </a:ln>
+        </p:spPr>
+        <p:style>
+          <a:lnRef idx="1">
+            <a:schemeClr val="accent1"/>
+          </a:lnRef>
+          <a:fillRef idx="0">
+            <a:schemeClr val="accent1"/>
+          </a:fillRef>
+          <a:effectRef idx="0">
+            <a:schemeClr val="accent1"/>
+          </a:effectRef>
+          <a:fontRef idx="minor">
+            <a:schemeClr val="tx1"/>
+          </a:fontRef>
+        </p:style>
+      </p:cxnSp>
+      <p:cxnSp>
+        <p:nvCxnSpPr>
+          <p:cNvPr id="65" name="Rechte verbindingslijn met pijl 64"/>
+          <p:cNvCxnSpPr/>
+          <p:nvPr/>
+        </p:nvCxnSpPr>
+        <p:spPr>
+          <a:xfrm flipV="1">
+            <a:off x="1331640" y="1566991"/>
+            <a:ext cx="5253" cy="416304"/>
+          </a:xfrm>
+          <a:prstGeom prst="straightConnector1">
+            <a:avLst/>
+          </a:prstGeom>
+          <a:ln w="15875">
+            <a:headEnd type="triangle"/>
+            <a:tailEnd type="triangle"/>
+          </a:ln>
+        </p:spPr>
+        <p:style>
+          <a:lnRef idx="1">
+            <a:schemeClr val="accent1"/>
+          </a:lnRef>
+          <a:fillRef idx="0">
+            <a:schemeClr val="accent1"/>
+          </a:fillRef>
+          <a:effectRef idx="0">
+            <a:schemeClr val="accent1"/>
+          </a:effectRef>
+          <a:fontRef idx="minor">
+            <a:schemeClr val="tx1"/>
+          </a:fontRef>
+        </p:style>
+      </p:cxnSp>
+      <p:sp>
+        <p:nvSpPr>
+          <p:cNvPr id="37" name="Tekstvak 36"/>
+          <p:cNvSpPr txBox="1"/>
+          <p:nvPr/>
+        </p:nvSpPr>
+        <p:spPr>
+          <a:xfrm>
+            <a:off x="7816681" y="792092"/>
+            <a:ext cx="1127232" cy="369332"/>
+          </a:xfrm>
+          <a:prstGeom prst="rect">
+            <a:avLst/>
+          </a:prstGeom>
+          <a:noFill/>
+        </p:spPr>
+        <p:txBody>
+          <a:bodyPr wrap="none" rtlCol="0">
+            <a:spAutoFit/>
+          </a:bodyPr>
+          <a:lstStyle/>
+          <a:p>
+            <a:r>
+              <a:rPr lang="nl-NL" dirty="0" err="1" smtClean="0"/>
+              <a:t>LamPI</a:t>
+            </a:r>
+            <a:r>
+              <a:rPr lang="nl-NL" dirty="0" smtClean="0"/>
+              <a:t> Gui</a:t>
+            </a:r>
+            <a:endParaRPr lang="nl-NL" dirty="0"/>
+          </a:p>
+        </p:txBody>
+      </p:sp>
+      <p:sp>
+        <p:nvSpPr>
+          <p:cNvPr id="71" name="Tekstvak 70"/>
+          <p:cNvSpPr txBox="1"/>
+          <p:nvPr/>
+        </p:nvSpPr>
+        <p:spPr>
+          <a:xfrm>
+            <a:off x="7715456" y="2134116"/>
+            <a:ext cx="1287532" cy="369332"/>
+          </a:xfrm>
+          <a:prstGeom prst="rect">
+            <a:avLst/>
+          </a:prstGeom>
+          <a:noFill/>
+        </p:spPr>
+        <p:txBody>
+          <a:bodyPr wrap="none" rtlCol="0">
+            <a:spAutoFit/>
+          </a:bodyPr>
+          <a:lstStyle/>
+          <a:p>
+            <a:r>
+              <a:rPr lang="nl-NL" dirty="0" err="1" smtClean="0"/>
+              <a:t>LamPI</a:t>
+            </a:r>
+            <a:r>
+              <a:rPr lang="nl-NL" dirty="0" smtClean="0"/>
+              <a:t> node</a:t>
+            </a:r>
+            <a:endParaRPr lang="nl-NL" dirty="0"/>
+          </a:p>
+        </p:txBody>
+      </p:sp>
+      <p:sp>
+        <p:nvSpPr>
+          <p:cNvPr id="75" name="Tekstvak 74"/>
+          <p:cNvSpPr txBox="1"/>
+          <p:nvPr/>
+        </p:nvSpPr>
+        <p:spPr>
+          <a:xfrm>
+            <a:off x="7812191" y="4003268"/>
+            <a:ext cx="905248" cy="369332"/>
+          </a:xfrm>
+          <a:prstGeom prst="rect">
+            <a:avLst/>
+          </a:prstGeom>
+          <a:noFill/>
+        </p:spPr>
+        <p:txBody>
+          <a:bodyPr wrap="none" rtlCol="0">
+            <a:spAutoFit/>
+          </a:bodyPr>
+          <a:lstStyle/>
+          <a:p>
+            <a:r>
+              <a:rPr lang="nl-NL" dirty="0" smtClean="0"/>
+              <a:t>Sensors</a:t>
+            </a:r>
+            <a:endParaRPr lang="nl-NL" dirty="0"/>
+          </a:p>
+        </p:txBody>
+      </p:sp>
+      <p:sp>
+        <p:nvSpPr>
+          <p:cNvPr id="77" name="Tekstvak 76"/>
+          <p:cNvSpPr txBox="1"/>
+          <p:nvPr/>
+        </p:nvSpPr>
+        <p:spPr>
+          <a:xfrm>
+            <a:off x="7780689" y="4791459"/>
+            <a:ext cx="1346907" cy="646331"/>
+          </a:xfrm>
+          <a:prstGeom prst="rect">
+            <a:avLst/>
+          </a:prstGeom>
+          <a:noFill/>
+        </p:spPr>
+        <p:txBody>
+          <a:bodyPr wrap="none" rtlCol="0">
+            <a:spAutoFit/>
+          </a:bodyPr>
+          <a:lstStyle/>
+          <a:p>
+            <a:r>
+              <a:rPr lang="nl-NL" dirty="0" smtClean="0"/>
+              <a:t>Receivers /</a:t>
+            </a:r>
+          </a:p>
+          <a:p>
+            <a:r>
+              <a:rPr lang="nl-NL" dirty="0" smtClean="0"/>
+              <a:t>Transmitters</a:t>
+            </a:r>
+            <a:endParaRPr lang="nl-NL" dirty="0"/>
+          </a:p>
+        </p:txBody>
+      </p:sp>
+      <p:sp>
+        <p:nvSpPr>
+          <p:cNvPr id="91" name="Tekstvak 90"/>
+          <p:cNvSpPr txBox="1"/>
+          <p:nvPr/>
+        </p:nvSpPr>
+        <p:spPr>
+          <a:xfrm>
+            <a:off x="3059832" y="4869160"/>
+            <a:ext cx="659155" cy="369332"/>
+          </a:xfrm>
+          <a:prstGeom prst="rect">
+            <a:avLst/>
+          </a:prstGeom>
+          <a:noFill/>
+        </p:spPr>
+        <p:txBody>
+          <a:bodyPr wrap="none" rtlCol="0">
+            <a:spAutoFit/>
+          </a:bodyPr>
+          <a:lstStyle/>
+          <a:p>
+            <a:r>
+              <a:rPr lang="nl-NL" dirty="0" smtClean="0"/>
+              <a:t>GPIO</a:t>
+            </a:r>
+            <a:endParaRPr lang="nl-NL" dirty="0"/>
+          </a:p>
+        </p:txBody>
+      </p:sp>
+      <p:cxnSp>
+        <p:nvCxnSpPr>
+          <p:cNvPr id="96" name="Rechte verbindingslijn met pijl 95"/>
+          <p:cNvCxnSpPr/>
+          <p:nvPr/>
+        </p:nvCxnSpPr>
+        <p:spPr>
+          <a:xfrm>
+            <a:off x="2121625" y="2372297"/>
+            <a:ext cx="927252" cy="4344"/>
+          </a:xfrm>
+          <a:prstGeom prst="straightConnector1">
+            <a:avLst/>
+          </a:prstGeom>
+          <a:ln>
+            <a:tailEnd type="triangle"/>
+          </a:ln>
+        </p:spPr>
+        <p:style>
+          <a:lnRef idx="3">
+            <a:schemeClr val="accent1"/>
+          </a:lnRef>
+          <a:fillRef idx="0">
+            <a:schemeClr val="accent1"/>
+          </a:fillRef>
+          <a:effectRef idx="2">
+            <a:schemeClr val="accent1"/>
+          </a:effectRef>
+          <a:fontRef idx="minor">
+            <a:schemeClr val="tx1"/>
+          </a:fontRef>
+        </p:style>
+      </p:cxnSp>
+      <p:cxnSp>
+        <p:nvCxnSpPr>
+          <p:cNvPr id="98" name="Rechte verbindingslijn met pijl 97"/>
+          <p:cNvCxnSpPr/>
+          <p:nvPr/>
+        </p:nvCxnSpPr>
+        <p:spPr>
+          <a:xfrm>
+            <a:off x="2251564" y="2118558"/>
+            <a:ext cx="927252" cy="4344"/>
+          </a:xfrm>
+          <a:prstGeom prst="straightConnector1">
+            <a:avLst/>
+          </a:prstGeom>
+          <a:ln>
+            <a:tailEnd type="triangle"/>
+          </a:ln>
+        </p:spPr>
+        <p:style>
+          <a:lnRef idx="3">
+            <a:schemeClr val="accent1"/>
+          </a:lnRef>
+          <a:fillRef idx="0">
+            <a:schemeClr val="accent1"/>
+          </a:fillRef>
+          <a:effectRef idx="2">
+            <a:schemeClr val="accent1"/>
+          </a:effectRef>
+          <a:fontRef idx="minor">
+            <a:schemeClr val="tx1"/>
+          </a:fontRef>
+        </p:style>
+      </p:cxnSp>
+      <p:sp>
+        <p:nvSpPr>
+          <p:cNvPr id="105" name="Wolkvormige toelichting 104"/>
+          <p:cNvSpPr/>
+          <p:nvPr/>
+        </p:nvSpPr>
+        <p:spPr>
+          <a:xfrm>
+            <a:off x="5163618" y="3789040"/>
+            <a:ext cx="1895900" cy="1071952"/>
+          </a:xfrm>
+          <a:prstGeom prst="cloudCallout">
+            <a:avLst/>
+          </a:prstGeom>
+          <a:solidFill>
+            <a:schemeClr val="accent5">
+              <a:lumMod val="20000"/>
+              <a:lumOff val="80000"/>
+            </a:schemeClr>
+          </a:solidFill>
+        </p:spPr>
+        <p:style>
+          <a:lnRef idx="2">
+            <a:schemeClr val="accent1">
+              <a:shade val="50000"/>
+            </a:schemeClr>
+          </a:lnRef>
+          <a:fillRef idx="1">
+            <a:schemeClr val="accent1"/>
+          </a:fillRef>
+          <a:effectRef idx="0">
+            <a:schemeClr val="accent1"/>
+          </a:effectRef>
+          <a:fontRef idx="minor">
+            <a:schemeClr val="lt1"/>
+          </a:fontRef>
+        </p:style>
+        <p:txBody>
+          <a:bodyPr rtlCol="0" anchor="ctr"/>
+          <a:lstStyle/>
+          <a:p>
+            <a:pPr algn="ctr"/>
+            <a:endParaRPr lang="en-US"/>
+          </a:p>
+        </p:txBody>
+      </p:sp>
+      <p:sp>
+        <p:nvSpPr>
+          <p:cNvPr id="48" name="Stroomdiagram: Alternatief proces 47"/>
+          <p:cNvSpPr/>
+          <p:nvPr/>
+        </p:nvSpPr>
+        <p:spPr>
+          <a:xfrm>
+            <a:off x="475928" y="5093568"/>
+            <a:ext cx="1694419" cy="659832"/>
+          </a:xfrm>
+          <a:prstGeom prst="flowChartAlternateProcess">
+            <a:avLst/>
+          </a:prstGeom>
+          <a:solidFill>
+            <a:schemeClr val="accent6">
+              <a:lumMod val="60000"/>
+              <a:lumOff val="40000"/>
+            </a:schemeClr>
+          </a:solidFill>
+        </p:spPr>
+        <p:style>
+          <a:lnRef idx="2">
+            <a:schemeClr val="accent1">
+              <a:shade val="50000"/>
+            </a:schemeClr>
+          </a:lnRef>
+          <a:fillRef idx="1">
+            <a:schemeClr val="accent1"/>
+          </a:fillRef>
+          <a:effectRef idx="0">
+            <a:schemeClr val="accent1"/>
+          </a:effectRef>
+          <a:fontRef idx="minor">
+            <a:schemeClr val="lt1"/>
+          </a:fontRef>
+        </p:style>
+        <p:txBody>
+          <a:bodyPr rtlCol="0" anchor="ctr"/>
+          <a:lstStyle/>
+          <a:p>
+            <a:pPr algn="ctr"/>
+            <a:r>
+              <a:rPr lang="nl-NL" dirty="0" err="1" smtClean="0"/>
+              <a:t>LoRa</a:t>
+            </a:r>
+            <a:r>
+              <a:rPr lang="nl-NL" dirty="0" smtClean="0"/>
+              <a:t> </a:t>
+            </a:r>
+            <a:r>
+              <a:rPr lang="nl-NL" dirty="0" smtClean="0"/>
+              <a:t>Gateway</a:t>
+            </a:r>
+            <a:endParaRPr lang="en-US" dirty="0"/>
+          </a:p>
+        </p:txBody>
+      </p:sp>
+    </p:spTree>
+    <p:extLst>
+      <p:ext uri="{BB962C8B-B14F-4D97-AF65-F5344CB8AC3E}">
+        <p14:creationId xmlns:p14="http://schemas.microsoft.com/office/powerpoint/2010/main" val="3018103330"/>
+      </p:ext>
+    </p:extLst>
+  </p:cSld>
+  <p:clrMapOvr>
+    <a:masterClrMapping/>
+  </p:clrMapOvr>
 </p:sld>
 </file>
 

</xml_diff>